<commit_message>
updated with knowledge check
</commit_message>
<xml_diff>
--- a/help session/week3/week3_methods_and_problems.pptx
+++ b/help session/week3/week3_methods_and_problems.pptx
@@ -5,10 +5,10 @@
     <p:sldMasterId id="2147483648" r:id="rId1"/>
   </p:sldMasterIdLst>
   <p:notesMasterIdLst>
-    <p:notesMasterId r:id="rId9"/>
+    <p:notesMasterId r:id="rId10"/>
   </p:notesMasterIdLst>
   <p:handoutMasterIdLst>
-    <p:handoutMasterId r:id="rId10"/>
+    <p:handoutMasterId r:id="rId11"/>
   </p:handoutMasterIdLst>
   <p:sldIdLst>
     <p:sldId id="256" r:id="rId2"/>
@@ -17,7 +17,8 @@
     <p:sldId id="262" r:id="rId5"/>
     <p:sldId id="264" r:id="rId6"/>
     <p:sldId id="260" r:id="rId7"/>
-    <p:sldId id="263" r:id="rId8"/>
+    <p:sldId id="265" r:id="rId8"/>
+    <p:sldId id="263" r:id="rId9"/>
   </p:sldIdLst>
   <p:sldSz cx="13817600" cy="7772400"/>
   <p:notesSz cx="6858000" cy="9144000"/>
@@ -220,7 +221,7 @@
           <a:p>
             <a:fld id="{4D7E51A5-B478-1E40-8CBB-0DAA8831E99D}" type="datetimeFigureOut">
               <a:rPr lang="en-US" smtClean="0"/>
-              <a:t>9/6/20</a:t>
+              <a:t>2/1/21</a:t>
             </a:fld>
             <a:endParaRPr lang="en-US"/>
           </a:p>
@@ -385,7 +386,7 @@
           <a:p>
             <a:fld id="{D0ED587F-861E-6740-9643-E3DDAE89B8D6}" type="datetimeFigureOut">
               <a:rPr lang="en-US" smtClean="0"/>
-              <a:t>9/6/20</a:t>
+              <a:t>2/1/21</a:t>
             </a:fld>
             <a:endParaRPr lang="en-US"/>
           </a:p>
@@ -650,6 +651,97 @@
     </a:lvl9pPr>
   </p:notesStyle>
 </p:notesMaster>
+</file>
+
+<file path=ppt/notesSlides/notesSlide1.xml><?xml version="1.0" encoding="utf-8"?>
+<p:notes xmlns:a="http://schemas.openxmlformats.org/drawingml/2006/main" xmlns:r="http://schemas.openxmlformats.org/officeDocument/2006/relationships" xmlns:p="http://schemas.openxmlformats.org/presentationml/2006/main">
+  <p:cSld>
+    <p:spTree>
+      <p:nvGrpSpPr>
+        <p:cNvPr id="1" name=""/>
+        <p:cNvGrpSpPr/>
+        <p:nvPr/>
+      </p:nvGrpSpPr>
+      <p:grpSpPr>
+        <a:xfrm>
+          <a:off x="0" y="0"/>
+          <a:ext cx="0" cy="0"/>
+          <a:chOff x="0" y="0"/>
+          <a:chExt cx="0" cy="0"/>
+        </a:xfrm>
+      </p:grpSpPr>
+      <p:sp>
+        <p:nvSpPr>
+          <p:cNvPr id="2" name="Slide Image Placeholder 1"/>
+          <p:cNvSpPr>
+            <a:spLocks noGrp="1" noRot="1" noChangeAspect="1"/>
+          </p:cNvSpPr>
+          <p:nvPr>
+            <p:ph type="sldImg"/>
+          </p:nvPr>
+        </p:nvSpPr>
+        <p:spPr/>
+      </p:sp>
+      <p:sp>
+        <p:nvSpPr>
+          <p:cNvPr id="3" name="Notes Placeholder 2"/>
+          <p:cNvSpPr>
+            <a:spLocks noGrp="1"/>
+          </p:cNvSpPr>
+          <p:nvPr>
+            <p:ph type="body" idx="1"/>
+          </p:nvPr>
+        </p:nvSpPr>
+        <p:spPr/>
+        <p:txBody>
+          <a:bodyPr/>
+          <a:lstStyle/>
+          <a:p>
+            <a:r>
+              <a:rPr lang="en-US" dirty="0"/>
+              <a:t>TA – you may want to </a:t>
+            </a:r>
+            <a:r>
+              <a:rPr lang="en-US"/>
+              <a:t>demonstrate this one with code. </a:t>
+            </a:r>
+          </a:p>
+        </p:txBody>
+      </p:sp>
+      <p:sp>
+        <p:nvSpPr>
+          <p:cNvPr id="4" name="Slide Number Placeholder 3"/>
+          <p:cNvSpPr>
+            <a:spLocks noGrp="1"/>
+          </p:cNvSpPr>
+          <p:nvPr>
+            <p:ph type="sldNum" sz="quarter" idx="5"/>
+          </p:nvPr>
+        </p:nvSpPr>
+        <p:spPr/>
+        <p:txBody>
+          <a:bodyPr/>
+          <a:lstStyle/>
+          <a:p>
+            <a:fld id="{1A032F50-0B60-B34B-8422-4E195A5AE2C1}" type="slidenum">
+              <a:rPr lang="en-US" smtClean="0"/>
+              <a:t>7</a:t>
+            </a:fld>
+            <a:endParaRPr lang="en-US"/>
+          </a:p>
+        </p:txBody>
+      </p:sp>
+    </p:spTree>
+    <p:extLst>
+      <p:ext uri="{BB962C8B-B14F-4D97-AF65-F5344CB8AC3E}">
+        <p14:creationId xmlns:p14="http://schemas.microsoft.com/office/powerpoint/2010/main" val="667485867"/>
+      </p:ext>
+    </p:extLst>
+  </p:cSld>
+  <p:clrMapOvr>
+    <a:masterClrMapping/>
+  </p:clrMapOvr>
+</p:notes>
 </file>
 
 <file path=ppt/slideLayouts/slideLayout1.xml><?xml version="1.0" encoding="utf-8"?>
@@ -7129,13 +7221,13 @@
   <p:clrMapOvr>
     <a:masterClrMapping/>
   </p:clrMapOvr>
-  <mc:AlternateContent xmlns:mc="http://schemas.openxmlformats.org/markup-compatibility/2006">
-    <mc:Choice xmlns:p14="http://schemas.microsoft.com/office/powerpoint/2010/main" Requires="p14">
+  <mc:AlternateContent xmlns:mc="http://schemas.openxmlformats.org/markup-compatibility/2006" xmlns:p14="http://schemas.microsoft.com/office/powerpoint/2010/main">
+    <mc:Choice Requires="p14">
       <p:transition p14:dur="300">
         <p:fade/>
       </p:transition>
     </mc:Choice>
-    <mc:Fallback>
+    <mc:Fallback xmlns="">
       <p:transition>
         <p:fade/>
       </p:transition>
@@ -7207,7 +7299,7 @@
         </p:nvSpPr>
         <p:spPr>
           <a:xfrm>
-            <a:off x="628075" y="1463723"/>
+            <a:off x="628073" y="1456990"/>
             <a:ext cx="12561453" cy="6080078"/>
           </a:xfrm>
         </p:spPr>
@@ -7684,6 +7776,141 @@
           <p:cNvPr id="2" name="Title 1">
             <a:extLst>
               <a:ext uri="{FF2B5EF4-FFF2-40B4-BE49-F238E27FC236}">
+                <a16:creationId xmlns:a16="http://schemas.microsoft.com/office/drawing/2014/main" id="{4685093E-6FB1-3143-9E93-2431898C8462}"/>
+              </a:ext>
+            </a:extLst>
+          </p:cNvPr>
+          <p:cNvSpPr>
+            <a:spLocks noGrp="1"/>
+          </p:cNvSpPr>
+          <p:nvPr>
+            <p:ph type="title"/>
+          </p:nvPr>
+        </p:nvSpPr>
+        <p:spPr/>
+        <p:txBody>
+          <a:bodyPr/>
+          <a:lstStyle/>
+          <a:p>
+            <a:r>
+              <a:rPr lang="en-US" dirty="0"/>
+              <a:t>Knowledge Check: Discuss</a:t>
+            </a:r>
+          </a:p>
+        </p:txBody>
+      </p:sp>
+      <p:pic>
+        <p:nvPicPr>
+          <p:cNvPr id="4" name="Picture 3">
+            <a:extLst>
+              <a:ext uri="{FF2B5EF4-FFF2-40B4-BE49-F238E27FC236}">
+                <a16:creationId xmlns:a16="http://schemas.microsoft.com/office/drawing/2014/main" id="{16EE2E85-9CB3-E34B-8AE6-C77569467B2A}"/>
+              </a:ext>
+            </a:extLst>
+          </p:cNvPr>
+          <p:cNvPicPr>
+            <a:picLocks noChangeAspect="1"/>
+          </p:cNvPicPr>
+          <p:nvPr/>
+        </p:nvPicPr>
+        <p:blipFill>
+          <a:blip r:embed="rId3"/>
+          <a:stretch>
+            <a:fillRect/>
+          </a:stretch>
+        </p:blipFill>
+        <p:spPr>
+          <a:xfrm>
+            <a:off x="846438" y="1358900"/>
+            <a:ext cx="8788400" cy="5054600"/>
+          </a:xfrm>
+          <a:prstGeom prst="rect">
+            <a:avLst/>
+          </a:prstGeom>
+        </p:spPr>
+      </p:pic>
+      <p:sp>
+        <p:nvSpPr>
+          <p:cNvPr id="5" name="TextBox 4">
+            <a:extLst>
+              <a:ext uri="{FF2B5EF4-FFF2-40B4-BE49-F238E27FC236}">
+                <a16:creationId xmlns:a16="http://schemas.microsoft.com/office/drawing/2014/main" id="{E9E71A3A-CBC6-764B-BD47-0464C8293C94}"/>
+              </a:ext>
+            </a:extLst>
+          </p:cNvPr>
+          <p:cNvSpPr txBox="1"/>
+          <p:nvPr/>
+        </p:nvSpPr>
+        <p:spPr>
+          <a:xfrm>
+            <a:off x="7126650" y="6803849"/>
+            <a:ext cx="6062878" cy="400110"/>
+          </a:xfrm>
+          <a:prstGeom prst="rect">
+            <a:avLst/>
+          </a:prstGeom>
+          <a:noFill/>
+        </p:spPr>
+        <p:txBody>
+          <a:bodyPr wrap="none" rtlCol="0">
+            <a:spAutoFit/>
+          </a:bodyPr>
+          <a:lstStyle/>
+          <a:p>
+            <a:r>
+              <a:rPr lang="en-US" dirty="0"/>
+              <a:t>Going Further – What if we passed in “Monkey”, -10</a:t>
+            </a:r>
+          </a:p>
+        </p:txBody>
+      </p:sp>
+    </p:spTree>
+    <p:extLst>
+      <p:ext uri="{BB962C8B-B14F-4D97-AF65-F5344CB8AC3E}">
+        <p14:creationId xmlns:p14="http://schemas.microsoft.com/office/powerpoint/2010/main" val="2396264504"/>
+      </p:ext>
+    </p:extLst>
+  </p:cSld>
+  <p:clrMapOvr>
+    <a:masterClrMapping/>
+  </p:clrMapOvr>
+  <mc:AlternateContent xmlns:mc="http://schemas.openxmlformats.org/markup-compatibility/2006" xmlns:p14="http://schemas.microsoft.com/office/powerpoint/2010/main">
+    <mc:Choice Requires="p14">
+      <p:transition p14:dur="300">
+        <p:fade/>
+      </p:transition>
+    </mc:Choice>
+    <mc:Fallback xmlns="">
+      <p:transition>
+        <p:fade/>
+      </p:transition>
+    </mc:Fallback>
+  </mc:AlternateContent>
+</p:sld>
+</file>
+
+<file path=ppt/slides/slide8.xml><?xml version="1.0" encoding="utf-8"?>
+<p:sld xmlns:a="http://schemas.openxmlformats.org/drawingml/2006/main" xmlns:r="http://schemas.openxmlformats.org/officeDocument/2006/relationships" xmlns:p="http://schemas.openxmlformats.org/presentationml/2006/main">
+  <p:cSld>
+    <p:spTree>
+      <p:nvGrpSpPr>
+        <p:cNvPr id="1" name=""/>
+        <p:cNvGrpSpPr/>
+        <p:nvPr/>
+      </p:nvGrpSpPr>
+      <p:grpSpPr>
+        <a:xfrm>
+          <a:off x="0" y="0"/>
+          <a:ext cx="0" cy="0"/>
+          <a:chOff x="0" y="0"/>
+          <a:chExt cx="0" cy="0"/>
+        </a:xfrm>
+      </p:grpSpPr>
+      <p:sp>
+        <p:nvSpPr>
+          <p:cNvPr id="2" name="Title 1">
+            <a:extLst>
+              <a:ext uri="{FF2B5EF4-FFF2-40B4-BE49-F238E27FC236}">
                 <a16:creationId xmlns:a16="http://schemas.microsoft.com/office/drawing/2014/main" id="{7E626FCC-498C-C74E-8536-E4C69A7F570D}"/>
               </a:ext>
             </a:extLst>
@@ -7725,7 +7952,7 @@
         </p:nvSpPr>
         <p:spPr>
           <a:xfrm>
-            <a:off x="628075" y="1628093"/>
+            <a:off x="628072" y="1463722"/>
             <a:ext cx="12561453" cy="5572807"/>
           </a:xfrm>
         </p:spPr>

</xml_diff>